<commit_message>
fixed issue with workflow 3 graph
</commit_message>
<xml_diff>
--- a/example_workflow_3/provenance/workflow_3_graph.pptx
+++ b/example_workflow_3/provenance/workflow_3_graph.pptx
@@ -115,7 +115,7 @@
 <file path=ppt/revisionInfo.xml><?xml version="1.0" encoding="utf-8"?>
 <p1510:revInfo xmlns:a="http://schemas.openxmlformats.org/drawingml/2006/main" xmlns:r="http://schemas.openxmlformats.org/officeDocument/2006/relationships" xmlns:p1510="http://schemas.microsoft.com/office/powerpoint/2015/10/main">
   <p1510:revLst>
-    <p1510:client id="{7703DDF1-2F33-4E6E-99AF-5938D7FA564E}" v="49" dt="2023-10-20T21:44:50.119"/>
+    <p1510:client id="{394A6FB4-BD60-43A7-BABA-3DA4CD43BF86}" v="5" dt="2023-10-24T20:33:52.756"/>
   </p1510:revLst>
 </p1510:revInfo>
 </file>
@@ -3409,6 +3409,158 @@
             <pc:docMk/>
             <pc:sldMk cId="1645475767" sldId="256"/>
             <ac:cxnSpMk id="293" creationId="{465BFAD8-046F-A3E1-6259-03C898568E09}"/>
+          </ac:cxnSpMkLst>
+        </pc:cxnChg>
+      </pc:sldChg>
+    </pc:docChg>
+  </pc:docChgLst>
+  <pc:docChgLst>
+    <pc:chgData name="Joseph Wonsil" userId="f7a5a8f17f3cf2df" providerId="LiveId" clId="{394A6FB4-BD60-43A7-BABA-3DA4CD43BF86}"/>
+    <pc:docChg chg="undo custSel modSld">
+      <pc:chgData name="Joseph Wonsil" userId="f7a5a8f17f3cf2df" providerId="LiveId" clId="{394A6FB4-BD60-43A7-BABA-3DA4CD43BF86}" dt="2023-10-24T20:35:24.134" v="80" actId="14100"/>
+      <pc:docMkLst>
+        <pc:docMk/>
+      </pc:docMkLst>
+      <pc:sldChg chg="addSp delSp modSp mod">
+        <pc:chgData name="Joseph Wonsil" userId="f7a5a8f17f3cf2df" providerId="LiveId" clId="{394A6FB4-BD60-43A7-BABA-3DA4CD43BF86}" dt="2023-10-24T20:35:24.134" v="80" actId="14100"/>
+        <pc:sldMkLst>
+          <pc:docMk/>
+          <pc:sldMk cId="1645475767" sldId="256"/>
+        </pc:sldMkLst>
+        <pc:spChg chg="add mod">
+          <ac:chgData name="Joseph Wonsil" userId="f7a5a8f17f3cf2df" providerId="LiveId" clId="{394A6FB4-BD60-43A7-BABA-3DA4CD43BF86}" dt="2023-10-24T20:34:43.491" v="58" actId="1036"/>
+          <ac:spMkLst>
+            <pc:docMk/>
+            <pc:sldMk cId="1645475767" sldId="256"/>
+            <ac:spMk id="9" creationId="{19A96826-6960-3A8C-19E1-1DF0367BECBC}"/>
+          </ac:spMkLst>
+        </pc:spChg>
+        <pc:spChg chg="add mod">
+          <ac:chgData name="Joseph Wonsil" userId="f7a5a8f17f3cf2df" providerId="LiveId" clId="{394A6FB4-BD60-43A7-BABA-3DA4CD43BF86}" dt="2023-10-24T20:34:43.491" v="58" actId="1036"/>
+          <ac:spMkLst>
+            <pc:docMk/>
+            <pc:sldMk cId="1645475767" sldId="256"/>
+            <ac:spMk id="15" creationId="{6057B12F-244C-F462-C9AE-AA54364CE043}"/>
+          </ac:spMkLst>
+        </pc:spChg>
+        <pc:spChg chg="add mod">
+          <ac:chgData name="Joseph Wonsil" userId="f7a5a8f17f3cf2df" providerId="LiveId" clId="{394A6FB4-BD60-43A7-BABA-3DA4CD43BF86}" dt="2023-10-24T20:34:43.491" v="58" actId="1036"/>
+          <ac:spMkLst>
+            <pc:docMk/>
+            <pc:sldMk cId="1645475767" sldId="256"/>
+            <ac:spMk id="17" creationId="{C930F542-43D3-C289-4A3E-04B968057B26}"/>
+          </ac:spMkLst>
+        </pc:spChg>
+        <pc:spChg chg="add mod">
+          <ac:chgData name="Joseph Wonsil" userId="f7a5a8f17f3cf2df" providerId="LiveId" clId="{394A6FB4-BD60-43A7-BABA-3DA4CD43BF86}" dt="2023-10-24T20:34:16.783" v="42" actId="2085"/>
+          <ac:spMkLst>
+            <pc:docMk/>
+            <pc:sldMk cId="1645475767" sldId="256"/>
+            <ac:spMk id="35" creationId="{14E15EDB-6C8F-8C6A-6CEE-22A77E5C7038}"/>
+          </ac:spMkLst>
+        </pc:spChg>
+        <pc:spChg chg="add mod">
+          <ac:chgData name="Joseph Wonsil" userId="f7a5a8f17f3cf2df" providerId="LiveId" clId="{394A6FB4-BD60-43A7-BABA-3DA4CD43BF86}" dt="2023-10-24T20:34:16.783" v="42" actId="2085"/>
+          <ac:spMkLst>
+            <pc:docMk/>
+            <pc:sldMk cId="1645475767" sldId="256"/>
+            <ac:spMk id="43" creationId="{87F90BF9-A083-2296-870F-81AFDEE3944A}"/>
+          </ac:spMkLst>
+        </pc:spChg>
+        <pc:spChg chg="mod">
+          <ac:chgData name="Joseph Wonsil" userId="f7a5a8f17f3cf2df" providerId="LiveId" clId="{394A6FB4-BD60-43A7-BABA-3DA4CD43BF86}" dt="2023-10-24T20:34:43.491" v="58" actId="1036"/>
+          <ac:spMkLst>
+            <pc:docMk/>
+            <pc:sldMk cId="1645475767" sldId="256"/>
+            <ac:spMk id="64" creationId="{00AF63C8-E610-166A-EB8D-9A5E75D0C542}"/>
+          </ac:spMkLst>
+        </pc:spChg>
+        <pc:spChg chg="mod">
+          <ac:chgData name="Joseph Wonsil" userId="f7a5a8f17f3cf2df" providerId="LiveId" clId="{394A6FB4-BD60-43A7-BABA-3DA4CD43BF86}" dt="2023-10-24T20:35:19.122" v="79" actId="1035"/>
+          <ac:spMkLst>
+            <pc:docMk/>
+            <pc:sldMk cId="1645475767" sldId="256"/>
+            <ac:spMk id="65" creationId="{F5A0FF69-C258-EB4C-AD36-26FCB9C84FFB}"/>
+          </ac:spMkLst>
+        </pc:spChg>
+        <pc:spChg chg="mod">
+          <ac:chgData name="Joseph Wonsil" userId="f7a5a8f17f3cf2df" providerId="LiveId" clId="{394A6FB4-BD60-43A7-BABA-3DA4CD43BF86}" dt="2023-10-24T20:33:33.453" v="23" actId="1076"/>
+          <ac:spMkLst>
+            <pc:docMk/>
+            <pc:sldMk cId="1645475767" sldId="256"/>
+            <ac:spMk id="67" creationId="{D1DA118C-BB7F-C467-916F-B8CA62C1A73E}"/>
+          </ac:spMkLst>
+        </pc:spChg>
+        <pc:spChg chg="del">
+          <ac:chgData name="Joseph Wonsil" userId="f7a5a8f17f3cf2df" providerId="LiveId" clId="{394A6FB4-BD60-43A7-BABA-3DA4CD43BF86}" dt="2023-10-24T20:33:13.093" v="21" actId="478"/>
+          <ac:spMkLst>
+            <pc:docMk/>
+            <pc:sldMk cId="1645475767" sldId="256"/>
+            <ac:spMk id="72" creationId="{DF26985C-D81A-5506-F6AE-ADF0F3049273}"/>
+          </ac:spMkLst>
+        </pc:spChg>
+        <pc:spChg chg="del">
+          <ac:chgData name="Joseph Wonsil" userId="f7a5a8f17f3cf2df" providerId="LiveId" clId="{394A6FB4-BD60-43A7-BABA-3DA4CD43BF86}" dt="2023-10-24T20:33:35.393" v="24" actId="478"/>
+          <ac:spMkLst>
+            <pc:docMk/>
+            <pc:sldMk cId="1645475767" sldId="256"/>
+            <ac:spMk id="79" creationId="{81AD025B-262E-A140-642B-7B5119375D75}"/>
+          </ac:spMkLst>
+        </pc:spChg>
+        <pc:spChg chg="del">
+          <ac:chgData name="Joseph Wonsil" userId="f7a5a8f17f3cf2df" providerId="LiveId" clId="{394A6FB4-BD60-43A7-BABA-3DA4CD43BF86}" dt="2023-10-24T20:33:16.336" v="22" actId="478"/>
+          <ac:spMkLst>
+            <pc:docMk/>
+            <pc:sldMk cId="1645475767" sldId="256"/>
+            <ac:spMk id="82" creationId="{BC8D52AF-865C-6AF4-DCE1-6341AA824C2C}"/>
+          </ac:spMkLst>
+        </pc:spChg>
+        <pc:spChg chg="mod">
+          <ac:chgData name="Joseph Wonsil" userId="f7a5a8f17f3cf2df" providerId="LiveId" clId="{394A6FB4-BD60-43A7-BABA-3DA4CD43BF86}" dt="2023-10-24T20:35:13.304" v="68" actId="1036"/>
+          <ac:spMkLst>
+            <pc:docMk/>
+            <pc:sldMk cId="1645475767" sldId="256"/>
+            <ac:spMk id="138" creationId="{3D0B3378-5BFA-8F54-C8BE-0EF04EC82A48}"/>
+          </ac:spMkLst>
+        </pc:spChg>
+        <pc:cxnChg chg="mod">
+          <ac:chgData name="Joseph Wonsil" userId="f7a5a8f17f3cf2df" providerId="LiveId" clId="{394A6FB4-BD60-43A7-BABA-3DA4CD43BF86}" dt="2023-10-24T20:35:02.624" v="62" actId="14100"/>
+          <ac:cxnSpMkLst>
+            <pc:docMk/>
+            <pc:sldMk cId="1645475767" sldId="256"/>
+            <ac:cxnSpMk id="61" creationId="{7909407A-8A6F-0806-AF4F-6285482CA4F0}"/>
+          </ac:cxnSpMkLst>
+        </pc:cxnChg>
+        <pc:cxnChg chg="mod">
+          <ac:chgData name="Joseph Wonsil" userId="f7a5a8f17f3cf2df" providerId="LiveId" clId="{394A6FB4-BD60-43A7-BABA-3DA4CD43BF86}" dt="2023-10-24T20:35:24.134" v="80" actId="14100"/>
+          <ac:cxnSpMkLst>
+            <pc:docMk/>
+            <pc:sldMk cId="1645475767" sldId="256"/>
+            <ac:cxnSpMk id="66" creationId="{6E9844B3-7B13-601F-2D3D-49D6D0A56CA8}"/>
+          </ac:cxnSpMkLst>
+        </pc:cxnChg>
+        <pc:cxnChg chg="mod">
+          <ac:chgData name="Joseph Wonsil" userId="f7a5a8f17f3cf2df" providerId="LiveId" clId="{394A6FB4-BD60-43A7-BABA-3DA4CD43BF86}" dt="2023-10-24T20:34:58.610" v="61" actId="14100"/>
+          <ac:cxnSpMkLst>
+            <pc:docMk/>
+            <pc:sldMk cId="1645475767" sldId="256"/>
+            <ac:cxnSpMk id="70" creationId="{8D6235FA-A6E9-098E-BC22-BFDF18760CEA}"/>
+          </ac:cxnSpMkLst>
+        </pc:cxnChg>
+        <pc:cxnChg chg="mod">
+          <ac:chgData name="Joseph Wonsil" userId="f7a5a8f17f3cf2df" providerId="LiveId" clId="{394A6FB4-BD60-43A7-BABA-3DA4CD43BF86}" dt="2023-10-24T20:34:01.943" v="33" actId="14100"/>
+          <ac:cxnSpMkLst>
+            <pc:docMk/>
+            <pc:sldMk cId="1645475767" sldId="256"/>
+            <ac:cxnSpMk id="78" creationId="{5D42EA6E-3BCA-8FCC-9CDE-82CFEA3310D7}"/>
+          </ac:cxnSpMkLst>
+        </pc:cxnChg>
+        <pc:cxnChg chg="mod">
+          <ac:chgData name="Joseph Wonsil" userId="f7a5a8f17f3cf2df" providerId="LiveId" clId="{394A6FB4-BD60-43A7-BABA-3DA4CD43BF86}" dt="2023-10-24T20:35:07.070" v="63" actId="14100"/>
+          <ac:cxnSpMkLst>
+            <pc:docMk/>
+            <pc:sldMk cId="1645475767" sldId="256"/>
+            <ac:cxnSpMk id="81" creationId="{1CC86931-6B2A-C173-C79C-EF28BD88E863}"/>
           </ac:cxnSpMkLst>
         </pc:cxnChg>
       </pc:sldChg>
@@ -6138,7 +6290,7 @@
           <a:p>
             <a:fld id="{4DAAF268-B108-415A-8D22-4C329ED559E0}" type="datetimeFigureOut">
               <a:rPr lang="en-US" smtClean="0"/>
-              <a:t>10/20/2023</a:t>
+              <a:t>10/24/2023</a:t>
             </a:fld>
             <a:endParaRPr lang="en-US"/>
           </a:p>
@@ -6308,7 +6460,7 @@
           <a:p>
             <a:fld id="{4DAAF268-B108-415A-8D22-4C329ED559E0}" type="datetimeFigureOut">
               <a:rPr lang="en-US" smtClean="0"/>
-              <a:t>10/20/2023</a:t>
+              <a:t>10/24/2023</a:t>
             </a:fld>
             <a:endParaRPr lang="en-US"/>
           </a:p>
@@ -6488,7 +6640,7 @@
           <a:p>
             <a:fld id="{4DAAF268-B108-415A-8D22-4C329ED559E0}" type="datetimeFigureOut">
               <a:rPr lang="en-US" smtClean="0"/>
-              <a:t>10/20/2023</a:t>
+              <a:t>10/24/2023</a:t>
             </a:fld>
             <a:endParaRPr lang="en-US"/>
           </a:p>
@@ -6658,7 +6810,7 @@
           <a:p>
             <a:fld id="{4DAAF268-B108-415A-8D22-4C329ED559E0}" type="datetimeFigureOut">
               <a:rPr lang="en-US" smtClean="0"/>
-              <a:t>10/20/2023</a:t>
+              <a:t>10/24/2023</a:t>
             </a:fld>
             <a:endParaRPr lang="en-US"/>
           </a:p>
@@ -6902,7 +7054,7 @@
           <a:p>
             <a:fld id="{4DAAF268-B108-415A-8D22-4C329ED559E0}" type="datetimeFigureOut">
               <a:rPr lang="en-US" smtClean="0"/>
-              <a:t>10/20/2023</a:t>
+              <a:t>10/24/2023</a:t>
             </a:fld>
             <a:endParaRPr lang="en-US"/>
           </a:p>
@@ -7134,7 +7286,7 @@
           <a:p>
             <a:fld id="{4DAAF268-B108-415A-8D22-4C329ED559E0}" type="datetimeFigureOut">
               <a:rPr lang="en-US" smtClean="0"/>
-              <a:t>10/20/2023</a:t>
+              <a:t>10/24/2023</a:t>
             </a:fld>
             <a:endParaRPr lang="en-US"/>
           </a:p>
@@ -7501,7 +7653,7 @@
           <a:p>
             <a:fld id="{4DAAF268-B108-415A-8D22-4C329ED559E0}" type="datetimeFigureOut">
               <a:rPr lang="en-US" smtClean="0"/>
-              <a:t>10/20/2023</a:t>
+              <a:t>10/24/2023</a:t>
             </a:fld>
             <a:endParaRPr lang="en-US"/>
           </a:p>
@@ -7619,7 +7771,7 @@
           <a:p>
             <a:fld id="{4DAAF268-B108-415A-8D22-4C329ED559E0}" type="datetimeFigureOut">
               <a:rPr lang="en-US" smtClean="0"/>
-              <a:t>10/20/2023</a:t>
+              <a:t>10/24/2023</a:t>
             </a:fld>
             <a:endParaRPr lang="en-US"/>
           </a:p>
@@ -7714,7 +7866,7 @@
           <a:p>
             <a:fld id="{4DAAF268-B108-415A-8D22-4C329ED559E0}" type="datetimeFigureOut">
               <a:rPr lang="en-US" smtClean="0"/>
-              <a:t>10/20/2023</a:t>
+              <a:t>10/24/2023</a:t>
             </a:fld>
             <a:endParaRPr lang="en-US"/>
           </a:p>
@@ -7991,7 +8143,7 @@
           <a:p>
             <a:fld id="{4DAAF268-B108-415A-8D22-4C329ED559E0}" type="datetimeFigureOut">
               <a:rPr lang="en-US" smtClean="0"/>
-              <a:t>10/20/2023</a:t>
+              <a:t>10/24/2023</a:t>
             </a:fld>
             <a:endParaRPr lang="en-US"/>
           </a:p>
@@ -8248,7 +8400,7 @@
           <a:p>
             <a:fld id="{4DAAF268-B108-415A-8D22-4C329ED559E0}" type="datetimeFigureOut">
               <a:rPr lang="en-US" smtClean="0"/>
-              <a:t>10/20/2023</a:t>
+              <a:t>10/24/2023</a:t>
             </a:fld>
             <a:endParaRPr lang="en-US"/>
           </a:p>
@@ -8461,7 +8613,7 @@
           <a:p>
             <a:fld id="{4DAAF268-B108-415A-8D22-4C329ED559E0}" type="datetimeFigureOut">
               <a:rPr lang="en-US" smtClean="0"/>
-              <a:t>10/20/2023</a:t>
+              <a:t>10/24/2023</a:t>
             </a:fld>
             <a:endParaRPr lang="en-US"/>
           </a:p>
@@ -11261,18 +11413,20 @@
           </p:cNvPr>
           <p:cNvCxnSpPr>
             <a:cxnSpLocks/>
-            <a:stCxn id="64" idx="1"/>
+            <a:stCxn id="9" idx="1"/>
             <a:endCxn id="137" idx="3"/>
           </p:cNvCxnSpPr>
           <p:nvPr/>
         </p:nvCxnSpPr>
         <p:spPr>
-          <a:xfrm flipH="1" flipV="1">
-            <a:off x="2240626" y="9716196"/>
-            <a:ext cx="10106334" cy="8461"/>
+          <a:xfrm rot="10800000">
+            <a:off x="2240623" y="9716198"/>
+            <a:ext cx="10105272" cy="199395"/>
           </a:xfrm>
-          <a:prstGeom prst="straightConnector1">
-            <a:avLst/>
+          <a:prstGeom prst="bentConnector3">
+            <a:avLst>
+              <a:gd name="adj1" fmla="val 13191"/>
+            </a:avLst>
           </a:prstGeom>
           <a:ln w="19050">
             <a:solidFill>
@@ -11311,8 +11465,8 @@
         </p:nvSpPr>
         <p:spPr>
           <a:xfrm>
-            <a:off x="12346957" y="9507306"/>
-            <a:ext cx="3101840" cy="434695"/>
+            <a:off x="12346957" y="9693282"/>
+            <a:ext cx="3101840" cy="722318"/>
           </a:xfrm>
           <a:prstGeom prst="rect">
             <a:avLst/>
@@ -11375,7 +11529,7 @@
         </p:nvSpPr>
         <p:spPr>
           <a:xfrm>
-            <a:off x="1995368" y="9928967"/>
+            <a:off x="1995368" y="10006457"/>
             <a:ext cx="1655126" cy="346249"/>
           </a:xfrm>
           <a:prstGeom prst="rect">
@@ -11409,18 +11563,20 @@
           </p:cNvPr>
           <p:cNvCxnSpPr>
             <a:cxnSpLocks/>
-            <a:stCxn id="67" idx="1"/>
+            <a:stCxn id="35" idx="1"/>
             <a:endCxn id="138" idx="3"/>
           </p:cNvCxnSpPr>
           <p:nvPr/>
         </p:nvCxnSpPr>
         <p:spPr>
-          <a:xfrm flipH="1">
-            <a:off x="2256651" y="10278879"/>
-            <a:ext cx="10101720" cy="56205"/>
+          <a:xfrm rot="10800000">
+            <a:off x="2256650" y="10412577"/>
+            <a:ext cx="10115334" cy="369818"/>
           </a:xfrm>
-          <a:prstGeom prst="straightConnector1">
-            <a:avLst/>
+          <a:prstGeom prst="bentConnector3">
+            <a:avLst>
+              <a:gd name="adj1" fmla="val 3729"/>
+            </a:avLst>
           </a:prstGeom>
           <a:ln w="19050">
             <a:solidFill>
@@ -11459,7 +11615,7 @@
         </p:nvSpPr>
         <p:spPr>
           <a:xfrm>
-            <a:off x="12358375" y="10061531"/>
+            <a:off x="12358374" y="10648919"/>
             <a:ext cx="2767201" cy="434695"/>
           </a:xfrm>
           <a:prstGeom prst="rect">
@@ -11547,18 +11703,20 @@
           </p:cNvPr>
           <p:cNvCxnSpPr>
             <a:cxnSpLocks/>
-            <a:stCxn id="72" idx="1"/>
+            <a:stCxn id="15" idx="1"/>
             <a:endCxn id="139" idx="3"/>
           </p:cNvCxnSpPr>
           <p:nvPr/>
         </p:nvCxnSpPr>
         <p:spPr>
-          <a:xfrm flipH="1" flipV="1">
-            <a:off x="2237825" y="10866266"/>
-            <a:ext cx="10120459" cy="26763"/>
+          <a:xfrm rot="10800000" flipV="1">
+            <a:off x="2237819" y="10099836"/>
+            <a:ext cx="10120031" cy="766432"/>
           </a:xfrm>
-          <a:prstGeom prst="straightConnector1">
-            <a:avLst/>
+          <a:prstGeom prst="bentConnector3">
+            <a:avLst>
+              <a:gd name="adj1" fmla="val 12939"/>
+            </a:avLst>
           </a:prstGeom>
           <a:ln w="19050">
             <a:solidFill>
@@ -11583,70 +11741,6 @@
           </a:fontRef>
         </p:style>
       </p:cxnSp>
-      <p:sp>
-        <p:nvSpPr>
-          <p:cNvPr id="72" name="Rectangle 71">
-            <a:extLst>
-              <a:ext uri="{FF2B5EF4-FFF2-40B4-BE49-F238E27FC236}">
-                <a16:creationId xmlns:a16="http://schemas.microsoft.com/office/drawing/2014/main" id="{DF26985C-D81A-5506-F6AE-ADF0F3049273}"/>
-              </a:ext>
-            </a:extLst>
-          </p:cNvPr>
-          <p:cNvSpPr/>
-          <p:nvPr/>
-        </p:nvSpPr>
-        <p:spPr>
-          <a:xfrm>
-            <a:off x="12358282" y="10675678"/>
-            <a:ext cx="3090521" cy="434695"/>
-          </a:xfrm>
-          <a:prstGeom prst="rect">
-            <a:avLst/>
-          </a:prstGeom>
-        </p:spPr>
-        <p:style>
-          <a:lnRef idx="2">
-            <a:schemeClr val="dk1"/>
-          </a:lnRef>
-          <a:fillRef idx="1">
-            <a:schemeClr val="lt1"/>
-          </a:fillRef>
-          <a:effectRef idx="0">
-            <a:schemeClr val="dk1"/>
-          </a:effectRef>
-          <a:fontRef idx="minor">
-            <a:schemeClr val="dk1"/>
-          </a:fontRef>
-        </p:style>
-        <p:txBody>
-          <a:bodyPr lIns="114301" tIns="57150" rIns="114301" bIns="57150" rtlCol="0" anchor="ctr"/>
-          <a:lstStyle/>
-          <a:p>
-            <a:pPr algn="ctr"/>
-            <a:r>
-              <a:rPr lang="en-US" sz="1500" dirty="0">
-                <a:solidFill>
-                  <a:srgbClr val="000000"/>
-                </a:solidFill>
-                <a:ea typeface="+mn-lt"/>
-                <a:cs typeface="+mn-lt"/>
-              </a:rPr>
-              <a:t>/home/pr/exp3/.</a:t>
-            </a:r>
-            <a:r>
-              <a:rPr lang="en-US" sz="1500" dirty="0" err="1">
-                <a:solidFill>
-                  <a:srgbClr val="000000"/>
-                </a:solidFill>
-                <a:ea typeface="+mn-lt"/>
-                <a:cs typeface="+mn-lt"/>
-              </a:rPr>
-              <a:t>train_model.py.swp</a:t>
-            </a:r>
-            <a:endParaRPr lang="en-US" sz="2250" dirty="0"/>
-          </a:p>
-        </p:txBody>
-      </p:sp>
       <p:sp>
         <p:nvSpPr>
           <p:cNvPr id="76" name="TextBox 75">
@@ -11695,18 +11789,20 @@
           </p:cNvPr>
           <p:cNvCxnSpPr>
             <a:cxnSpLocks/>
-            <a:stCxn id="79" idx="1"/>
+            <a:stCxn id="43" idx="1"/>
             <a:endCxn id="140" idx="3"/>
           </p:cNvCxnSpPr>
           <p:nvPr/>
         </p:nvCxnSpPr>
         <p:spPr>
-          <a:xfrm flipH="1" flipV="1">
-            <a:off x="2227757" y="11422252"/>
-            <a:ext cx="10134045" cy="10018"/>
+          <a:xfrm rot="10800000" flipV="1">
+            <a:off x="2227754" y="10950375"/>
+            <a:ext cx="10140285" cy="471881"/>
           </a:xfrm>
-          <a:prstGeom prst="straightConnector1">
-            <a:avLst/>
+          <a:prstGeom prst="bentConnector3">
+            <a:avLst>
+              <a:gd name="adj1" fmla="val 3690"/>
+            </a:avLst>
           </a:prstGeom>
           <a:ln w="19050">
             <a:solidFill>
@@ -11731,60 +11827,6 @@
           </a:fontRef>
         </p:style>
       </p:cxnSp>
-      <p:sp>
-        <p:nvSpPr>
-          <p:cNvPr id="79" name="Rectangle 78">
-            <a:extLst>
-              <a:ext uri="{FF2B5EF4-FFF2-40B4-BE49-F238E27FC236}">
-                <a16:creationId xmlns:a16="http://schemas.microsoft.com/office/drawing/2014/main" id="{81AD025B-262E-A140-642B-7B5119375D75}"/>
-              </a:ext>
-            </a:extLst>
-          </p:cNvPr>
-          <p:cNvSpPr/>
-          <p:nvPr/>
-        </p:nvSpPr>
-        <p:spPr>
-          <a:xfrm>
-            <a:off x="12361803" y="11214924"/>
-            <a:ext cx="2763773" cy="434695"/>
-          </a:xfrm>
-          <a:prstGeom prst="rect">
-            <a:avLst/>
-          </a:prstGeom>
-        </p:spPr>
-        <p:style>
-          <a:lnRef idx="2">
-            <a:schemeClr val="dk1"/>
-          </a:lnRef>
-          <a:fillRef idx="1">
-            <a:schemeClr val="lt1"/>
-          </a:fillRef>
-          <a:effectRef idx="0">
-            <a:schemeClr val="dk1"/>
-          </a:effectRef>
-          <a:fontRef idx="minor">
-            <a:schemeClr val="dk1"/>
-          </a:fontRef>
-        </p:style>
-        <p:txBody>
-          <a:bodyPr lIns="114301" tIns="57150" rIns="114301" bIns="57150" rtlCol="0" anchor="ctr"/>
-          <a:lstStyle/>
-          <a:p>
-            <a:pPr algn="ctr"/>
-            <a:r>
-              <a:rPr lang="en-US" sz="1500" dirty="0">
-                <a:solidFill>
-                  <a:srgbClr val="000000"/>
-                </a:solidFill>
-                <a:ea typeface="+mn-lt"/>
-                <a:cs typeface="+mn-lt"/>
-              </a:rPr>
-              <a:t>/home/pr/exp3/.train_model.py</a:t>
-            </a:r>
-            <a:endParaRPr lang="en-US" sz="2250" dirty="0"/>
-          </a:p>
-        </p:txBody>
-      </p:sp>
       <p:sp>
         <p:nvSpPr>
           <p:cNvPr id="80" name="TextBox 79">
@@ -11833,18 +11875,20 @@
           </p:cNvPr>
           <p:cNvCxnSpPr>
             <a:cxnSpLocks/>
-            <a:stCxn id="82" idx="1"/>
+            <a:stCxn id="17" idx="1"/>
             <a:endCxn id="391" idx="3"/>
           </p:cNvCxnSpPr>
           <p:nvPr/>
         </p:nvCxnSpPr>
         <p:spPr>
-          <a:xfrm flipH="1" flipV="1">
-            <a:off x="2241506" y="11991925"/>
-            <a:ext cx="10116589" cy="24533"/>
+          <a:xfrm rot="10800000" flipV="1">
+            <a:off x="2241501" y="10267817"/>
+            <a:ext cx="10115518" cy="1724112"/>
           </a:xfrm>
-          <a:prstGeom prst="straightConnector1">
-            <a:avLst/>
+          <a:prstGeom prst="bentConnector3">
+            <a:avLst>
+              <a:gd name="adj1" fmla="val 10931"/>
+            </a:avLst>
           </a:prstGeom>
           <a:ln w="19050">
             <a:solidFill>
@@ -11869,70 +11913,6 @@
           </a:fontRef>
         </p:style>
       </p:cxnSp>
-      <p:sp>
-        <p:nvSpPr>
-          <p:cNvPr id="82" name="Rectangle 81">
-            <a:extLst>
-              <a:ext uri="{FF2B5EF4-FFF2-40B4-BE49-F238E27FC236}">
-                <a16:creationId xmlns:a16="http://schemas.microsoft.com/office/drawing/2014/main" id="{BC8D52AF-865C-6AF4-DCE1-6341AA824C2C}"/>
-              </a:ext>
-            </a:extLst>
-          </p:cNvPr>
-          <p:cNvSpPr/>
-          <p:nvPr/>
-        </p:nvSpPr>
-        <p:spPr>
-          <a:xfrm>
-            <a:off x="12358091" y="11799111"/>
-            <a:ext cx="3101840" cy="434695"/>
-          </a:xfrm>
-          <a:prstGeom prst="rect">
-            <a:avLst/>
-          </a:prstGeom>
-        </p:spPr>
-        <p:style>
-          <a:lnRef idx="2">
-            <a:schemeClr val="dk1"/>
-          </a:lnRef>
-          <a:fillRef idx="1">
-            <a:schemeClr val="lt1"/>
-          </a:fillRef>
-          <a:effectRef idx="0">
-            <a:schemeClr val="dk1"/>
-          </a:effectRef>
-          <a:fontRef idx="minor">
-            <a:schemeClr val="dk1"/>
-          </a:fontRef>
-        </p:style>
-        <p:txBody>
-          <a:bodyPr lIns="114301" tIns="57150" rIns="114301" bIns="57150" rtlCol="0" anchor="ctr"/>
-          <a:lstStyle/>
-          <a:p>
-            <a:pPr algn="ctr"/>
-            <a:r>
-              <a:rPr lang="en-US" sz="1500" dirty="0">
-                <a:solidFill>
-                  <a:srgbClr val="000000"/>
-                </a:solidFill>
-                <a:ea typeface="+mn-lt"/>
-                <a:cs typeface="+mn-lt"/>
-              </a:rPr>
-              <a:t>/home/pr/exp3/.</a:t>
-            </a:r>
-            <a:r>
-              <a:rPr lang="en-US" sz="1500" dirty="0" err="1">
-                <a:solidFill>
-                  <a:srgbClr val="000000"/>
-                </a:solidFill>
-                <a:ea typeface="+mn-lt"/>
-                <a:cs typeface="+mn-lt"/>
-              </a:rPr>
-              <a:t>train_model.py.swp</a:t>
-            </a:r>
-            <a:endParaRPr lang="en-US" sz="2250" dirty="0"/>
-          </a:p>
-        </p:txBody>
-      </p:sp>
       <p:sp>
         <p:nvSpPr>
           <p:cNvPr id="83" name="Arrow: Down 82">
@@ -13652,7 +13632,7 @@
         </p:nvSpPr>
         <p:spPr>
           <a:xfrm>
-            <a:off x="-266488" y="10297021"/>
+            <a:off x="-266488" y="10374511"/>
             <a:ext cx="2523138" cy="76131"/>
           </a:xfrm>
           <a:prstGeom prst="rect">
@@ -14053,6 +14033,246 @@
               <a:ea typeface="Calibri"/>
               <a:cs typeface="Calibri"/>
             </a:endParaRPr>
+          </a:p>
+        </p:txBody>
+      </p:sp>
+      <p:sp>
+        <p:nvSpPr>
+          <p:cNvPr id="9" name="Rectangle 8">
+            <a:extLst>
+              <a:ext uri="{FF2B5EF4-FFF2-40B4-BE49-F238E27FC236}">
+                <a16:creationId xmlns:a16="http://schemas.microsoft.com/office/drawing/2014/main" id="{19A96826-6960-3A8C-19E1-1DF0367BECBC}"/>
+              </a:ext>
+            </a:extLst>
+          </p:cNvPr>
+          <p:cNvSpPr/>
+          <p:nvPr/>
+        </p:nvSpPr>
+        <p:spPr>
+          <a:xfrm>
+            <a:off x="12345895" y="9877526"/>
+            <a:ext cx="2523138" cy="76131"/>
+          </a:xfrm>
+          <a:prstGeom prst="rect">
+            <a:avLst/>
+          </a:prstGeom>
+          <a:noFill/>
+          <a:ln>
+            <a:noFill/>
+          </a:ln>
+        </p:spPr>
+        <p:style>
+          <a:lnRef idx="2">
+            <a:schemeClr val="dk1"/>
+          </a:lnRef>
+          <a:fillRef idx="1">
+            <a:schemeClr val="lt1"/>
+          </a:fillRef>
+          <a:effectRef idx="0">
+            <a:schemeClr val="dk1"/>
+          </a:effectRef>
+          <a:fontRef idx="minor">
+            <a:schemeClr val="dk1"/>
+          </a:fontRef>
+        </p:style>
+        <p:txBody>
+          <a:bodyPr rtlCol="0" anchor="ctr"/>
+          <a:lstStyle/>
+          <a:p>
+            <a:pPr algn="ctr"/>
+            <a:endParaRPr lang="en-US" sz="1500" dirty="0"/>
+          </a:p>
+        </p:txBody>
+      </p:sp>
+      <p:sp>
+        <p:nvSpPr>
+          <p:cNvPr id="15" name="Rectangle 14">
+            <a:extLst>
+              <a:ext uri="{FF2B5EF4-FFF2-40B4-BE49-F238E27FC236}">
+                <a16:creationId xmlns:a16="http://schemas.microsoft.com/office/drawing/2014/main" id="{6057B12F-244C-F462-C9AE-AA54364CE043}"/>
+              </a:ext>
+            </a:extLst>
+          </p:cNvPr>
+          <p:cNvSpPr/>
+          <p:nvPr/>
+        </p:nvSpPr>
+        <p:spPr>
+          <a:xfrm>
+            <a:off x="12357849" y="10061770"/>
+            <a:ext cx="2523138" cy="76131"/>
+          </a:xfrm>
+          <a:prstGeom prst="rect">
+            <a:avLst/>
+          </a:prstGeom>
+          <a:noFill/>
+          <a:ln>
+            <a:noFill/>
+          </a:ln>
+        </p:spPr>
+        <p:style>
+          <a:lnRef idx="2">
+            <a:schemeClr val="dk1"/>
+          </a:lnRef>
+          <a:fillRef idx="1">
+            <a:schemeClr val="lt1"/>
+          </a:fillRef>
+          <a:effectRef idx="0">
+            <a:schemeClr val="dk1"/>
+          </a:effectRef>
+          <a:fontRef idx="minor">
+            <a:schemeClr val="dk1"/>
+          </a:fontRef>
+        </p:style>
+        <p:txBody>
+          <a:bodyPr rtlCol="0" anchor="ctr"/>
+          <a:lstStyle/>
+          <a:p>
+            <a:pPr algn="ctr"/>
+            <a:endParaRPr lang="en-US" sz="1500" dirty="0"/>
+          </a:p>
+        </p:txBody>
+      </p:sp>
+      <p:sp>
+        <p:nvSpPr>
+          <p:cNvPr id="17" name="Rectangle 16">
+            <a:extLst>
+              <a:ext uri="{FF2B5EF4-FFF2-40B4-BE49-F238E27FC236}">
+                <a16:creationId xmlns:a16="http://schemas.microsoft.com/office/drawing/2014/main" id="{C930F542-43D3-C289-4A3E-04B968057B26}"/>
+              </a:ext>
+            </a:extLst>
+          </p:cNvPr>
+          <p:cNvSpPr/>
+          <p:nvPr/>
+        </p:nvSpPr>
+        <p:spPr>
+          <a:xfrm>
+            <a:off x="12357019" y="10229751"/>
+            <a:ext cx="2523138" cy="76131"/>
+          </a:xfrm>
+          <a:prstGeom prst="rect">
+            <a:avLst/>
+          </a:prstGeom>
+          <a:noFill/>
+          <a:ln>
+            <a:noFill/>
+          </a:ln>
+        </p:spPr>
+        <p:style>
+          <a:lnRef idx="2">
+            <a:schemeClr val="dk1"/>
+          </a:lnRef>
+          <a:fillRef idx="1">
+            <a:schemeClr val="lt1"/>
+          </a:fillRef>
+          <a:effectRef idx="0">
+            <a:schemeClr val="dk1"/>
+          </a:effectRef>
+          <a:fontRef idx="minor">
+            <a:schemeClr val="dk1"/>
+          </a:fontRef>
+        </p:style>
+        <p:txBody>
+          <a:bodyPr rtlCol="0" anchor="ctr"/>
+          <a:lstStyle/>
+          <a:p>
+            <a:pPr algn="ctr"/>
+            <a:endParaRPr lang="en-US" sz="1500" dirty="0"/>
+          </a:p>
+        </p:txBody>
+      </p:sp>
+      <p:sp>
+        <p:nvSpPr>
+          <p:cNvPr id="35" name="Rectangle 34">
+            <a:extLst>
+              <a:ext uri="{FF2B5EF4-FFF2-40B4-BE49-F238E27FC236}">
+                <a16:creationId xmlns:a16="http://schemas.microsoft.com/office/drawing/2014/main" id="{14E15EDB-6C8F-8C6A-6CEE-22A77E5C7038}"/>
+              </a:ext>
+            </a:extLst>
+          </p:cNvPr>
+          <p:cNvSpPr/>
+          <p:nvPr/>
+        </p:nvSpPr>
+        <p:spPr>
+          <a:xfrm>
+            <a:off x="12371984" y="10744329"/>
+            <a:ext cx="2523138" cy="76131"/>
+          </a:xfrm>
+          <a:prstGeom prst="rect">
+            <a:avLst/>
+          </a:prstGeom>
+          <a:noFill/>
+          <a:ln>
+            <a:noFill/>
+          </a:ln>
+        </p:spPr>
+        <p:style>
+          <a:lnRef idx="2">
+            <a:schemeClr val="dk1"/>
+          </a:lnRef>
+          <a:fillRef idx="1">
+            <a:schemeClr val="lt1"/>
+          </a:fillRef>
+          <a:effectRef idx="0">
+            <a:schemeClr val="dk1"/>
+          </a:effectRef>
+          <a:fontRef idx="minor">
+            <a:schemeClr val="dk1"/>
+          </a:fontRef>
+        </p:style>
+        <p:txBody>
+          <a:bodyPr rtlCol="0" anchor="ctr"/>
+          <a:lstStyle/>
+          <a:p>
+            <a:pPr algn="ctr"/>
+            <a:endParaRPr lang="en-US" sz="1500" dirty="0"/>
+          </a:p>
+        </p:txBody>
+      </p:sp>
+      <p:sp>
+        <p:nvSpPr>
+          <p:cNvPr id="43" name="Rectangle 42">
+            <a:extLst>
+              <a:ext uri="{FF2B5EF4-FFF2-40B4-BE49-F238E27FC236}">
+                <a16:creationId xmlns:a16="http://schemas.microsoft.com/office/drawing/2014/main" id="{87F90BF9-A083-2296-870F-81AFDEE3944A}"/>
+              </a:ext>
+            </a:extLst>
+          </p:cNvPr>
+          <p:cNvSpPr/>
+          <p:nvPr/>
+        </p:nvSpPr>
+        <p:spPr>
+          <a:xfrm>
+            <a:off x="12368038" y="10912310"/>
+            <a:ext cx="2523138" cy="76131"/>
+          </a:xfrm>
+          <a:prstGeom prst="rect">
+            <a:avLst/>
+          </a:prstGeom>
+          <a:noFill/>
+          <a:ln>
+            <a:noFill/>
+          </a:ln>
+        </p:spPr>
+        <p:style>
+          <a:lnRef idx="2">
+            <a:schemeClr val="dk1"/>
+          </a:lnRef>
+          <a:fillRef idx="1">
+            <a:schemeClr val="lt1"/>
+          </a:fillRef>
+          <a:effectRef idx="0">
+            <a:schemeClr val="dk1"/>
+          </a:effectRef>
+          <a:fontRef idx="minor">
+            <a:schemeClr val="dk1"/>
+          </a:fontRef>
+        </p:style>
+        <p:txBody>
+          <a:bodyPr rtlCol="0" anchor="ctr"/>
+          <a:lstStyle/>
+          <a:p>
+            <a:pPr algn="ctr"/>
+            <a:endParaRPr lang="en-US" sz="1500" dirty="0"/>
           </a:p>
         </p:txBody>
       </p:sp>

</xml_diff>

<commit_message>
update graph to remove duplicated node
</commit_message>
<xml_diff>
--- a/example_workflow_3/provenance/workflow_3_graph.pptx
+++ b/example_workflow_3/provenance/workflow_3_graph.pptx
@@ -6290,7 +6290,7 @@
           <a:p>
             <a:fld id="{4DAAF268-B108-415A-8D22-4C329ED559E0}" type="datetimeFigureOut">
               <a:rPr lang="en-US" smtClean="0"/>
-              <a:t>10/30/23</a:t>
+              <a:t>11/16/23</a:t>
             </a:fld>
             <a:endParaRPr lang="en-US"/>
           </a:p>
@@ -6460,7 +6460,7 @@
           <a:p>
             <a:fld id="{4DAAF268-B108-415A-8D22-4C329ED559E0}" type="datetimeFigureOut">
               <a:rPr lang="en-US" smtClean="0"/>
-              <a:t>10/30/23</a:t>
+              <a:t>11/16/23</a:t>
             </a:fld>
             <a:endParaRPr lang="en-US"/>
           </a:p>
@@ -6640,7 +6640,7 @@
           <a:p>
             <a:fld id="{4DAAF268-B108-415A-8D22-4C329ED559E0}" type="datetimeFigureOut">
               <a:rPr lang="en-US" smtClean="0"/>
-              <a:t>10/30/23</a:t>
+              <a:t>11/16/23</a:t>
             </a:fld>
             <a:endParaRPr lang="en-US"/>
           </a:p>
@@ -6810,7 +6810,7 @@
           <a:p>
             <a:fld id="{4DAAF268-B108-415A-8D22-4C329ED559E0}" type="datetimeFigureOut">
               <a:rPr lang="en-US" smtClean="0"/>
-              <a:t>10/30/23</a:t>
+              <a:t>11/16/23</a:t>
             </a:fld>
             <a:endParaRPr lang="en-US"/>
           </a:p>
@@ -7054,7 +7054,7 @@
           <a:p>
             <a:fld id="{4DAAF268-B108-415A-8D22-4C329ED559E0}" type="datetimeFigureOut">
               <a:rPr lang="en-US" smtClean="0"/>
-              <a:t>10/30/23</a:t>
+              <a:t>11/16/23</a:t>
             </a:fld>
             <a:endParaRPr lang="en-US"/>
           </a:p>
@@ -7286,7 +7286,7 @@
           <a:p>
             <a:fld id="{4DAAF268-B108-415A-8D22-4C329ED559E0}" type="datetimeFigureOut">
               <a:rPr lang="en-US" smtClean="0"/>
-              <a:t>10/30/23</a:t>
+              <a:t>11/16/23</a:t>
             </a:fld>
             <a:endParaRPr lang="en-US"/>
           </a:p>
@@ -7653,7 +7653,7 @@
           <a:p>
             <a:fld id="{4DAAF268-B108-415A-8D22-4C329ED559E0}" type="datetimeFigureOut">
               <a:rPr lang="en-US" smtClean="0"/>
-              <a:t>10/30/23</a:t>
+              <a:t>11/16/23</a:t>
             </a:fld>
             <a:endParaRPr lang="en-US"/>
           </a:p>
@@ -7771,7 +7771,7 @@
           <a:p>
             <a:fld id="{4DAAF268-B108-415A-8D22-4C329ED559E0}" type="datetimeFigureOut">
               <a:rPr lang="en-US" smtClean="0"/>
-              <a:t>10/30/23</a:t>
+              <a:t>11/16/23</a:t>
             </a:fld>
             <a:endParaRPr lang="en-US"/>
           </a:p>
@@ -7866,7 +7866,7 @@
           <a:p>
             <a:fld id="{4DAAF268-B108-415A-8D22-4C329ED559E0}" type="datetimeFigureOut">
               <a:rPr lang="en-US" smtClean="0"/>
-              <a:t>10/30/23</a:t>
+              <a:t>11/16/23</a:t>
             </a:fld>
             <a:endParaRPr lang="en-US"/>
           </a:p>
@@ -8143,7 +8143,7 @@
           <a:p>
             <a:fld id="{4DAAF268-B108-415A-8D22-4C329ED559E0}" type="datetimeFigureOut">
               <a:rPr lang="en-US" smtClean="0"/>
-              <a:t>10/30/23</a:t>
+              <a:t>11/16/23</a:t>
             </a:fld>
             <a:endParaRPr lang="en-US"/>
           </a:p>
@@ -8400,7 +8400,7 @@
           <a:p>
             <a:fld id="{4DAAF268-B108-415A-8D22-4C329ED559E0}" type="datetimeFigureOut">
               <a:rPr lang="en-US" smtClean="0"/>
-              <a:t>10/30/23</a:t>
+              <a:t>11/16/23</a:t>
             </a:fld>
             <a:endParaRPr lang="en-US"/>
           </a:p>
@@ -8613,7 +8613,7 @@
           <a:p>
             <a:fld id="{4DAAF268-B108-415A-8D22-4C329ED559E0}" type="datetimeFigureOut">
               <a:rPr lang="en-US" smtClean="0"/>
-              <a:t>10/30/23</a:t>
+              <a:t>11/16/23</a:t>
             </a:fld>
             <a:endParaRPr lang="en-US"/>
           </a:p>
@@ -10830,8 +10830,8 @@
         </p:nvSpPr>
         <p:spPr>
           <a:xfrm>
-            <a:off x="12377000" y="5764276"/>
-            <a:ext cx="3054682" cy="399093"/>
+            <a:off x="12377021" y="5866650"/>
+            <a:ext cx="3096072" cy="722318"/>
           </a:xfrm>
           <a:prstGeom prst="rect">
             <a:avLst/>
@@ -10910,15 +10910,13 @@
           </p:cNvPr>
           <p:cNvCxnSpPr>
             <a:cxnSpLocks/>
-            <a:stCxn id="36" idx="1"/>
-            <a:endCxn id="118" idx="3"/>
           </p:cNvCxnSpPr>
           <p:nvPr/>
         </p:nvCxnSpPr>
         <p:spPr>
-          <a:xfrm flipH="1" flipV="1">
-            <a:off x="2241501" y="5954222"/>
-            <a:ext cx="10135499" cy="9601"/>
+          <a:xfrm flipH="1">
+            <a:off x="2241501" y="5987539"/>
+            <a:ext cx="10124071" cy="6820"/>
           </a:xfrm>
           <a:prstGeom prst="straightConnector1">
             <a:avLst/>
@@ -11554,19 +11552,18 @@
           </p:cNvPr>
           <p:cNvCxnSpPr>
             <a:cxnSpLocks/>
-            <a:stCxn id="35" idx="1"/>
             <a:endCxn id="138" idx="3"/>
           </p:cNvCxnSpPr>
           <p:nvPr/>
         </p:nvCxnSpPr>
         <p:spPr>
-          <a:xfrm rot="10800000">
-            <a:off x="2256650" y="10412577"/>
-            <a:ext cx="10115334" cy="369818"/>
+          <a:xfrm rot="10800000" flipV="1">
+            <a:off x="2256651" y="6106453"/>
+            <a:ext cx="10109539" cy="4306124"/>
           </a:xfrm>
           <a:prstGeom prst="bentConnector3">
             <a:avLst>
-              <a:gd name="adj1" fmla="val 3729"/>
+              <a:gd name="adj1" fmla="val 26814"/>
             </a:avLst>
           </a:prstGeom>
           <a:ln w="19050">
@@ -11592,60 +11589,6 @@
           </a:fontRef>
         </p:style>
       </p:cxnSp>
-      <p:sp>
-        <p:nvSpPr>
-          <p:cNvPr id="67" name="Rectangle 66">
-            <a:extLst>
-              <a:ext uri="{FF2B5EF4-FFF2-40B4-BE49-F238E27FC236}">
-                <a16:creationId xmlns:a16="http://schemas.microsoft.com/office/drawing/2014/main" id="{D1DA118C-BB7F-C467-916F-B8CA62C1A73E}"/>
-              </a:ext>
-            </a:extLst>
-          </p:cNvPr>
-          <p:cNvSpPr/>
-          <p:nvPr/>
-        </p:nvSpPr>
-        <p:spPr>
-          <a:xfrm>
-            <a:off x="12358374" y="10676165"/>
-            <a:ext cx="3073308" cy="407449"/>
-          </a:xfrm>
-          <a:prstGeom prst="rect">
-            <a:avLst/>
-          </a:prstGeom>
-        </p:spPr>
-        <p:style>
-          <a:lnRef idx="2">
-            <a:schemeClr val="dk1"/>
-          </a:lnRef>
-          <a:fillRef idx="1">
-            <a:schemeClr val="lt1"/>
-          </a:fillRef>
-          <a:effectRef idx="0">
-            <a:schemeClr val="dk1"/>
-          </a:effectRef>
-          <a:fontRef idx="minor">
-            <a:schemeClr val="dk1"/>
-          </a:fontRef>
-        </p:style>
-        <p:txBody>
-          <a:bodyPr lIns="114301" tIns="57150" rIns="114301" bIns="57150" rtlCol="0" anchor="ctr"/>
-          <a:lstStyle/>
-          <a:p>
-            <a:pPr algn="ctr"/>
-            <a:r>
-              <a:rPr lang="en-US" sz="1600" dirty="0">
-                <a:solidFill>
-                  <a:srgbClr val="000000"/>
-                </a:solidFill>
-                <a:ea typeface="+mn-lt"/>
-                <a:cs typeface="+mn-lt"/>
-              </a:rPr>
-              <a:t>/home/pr/exp3/.train_model.py</a:t>
-            </a:r>
-            <a:endParaRPr lang="en-US" sz="1600" dirty="0"/>
-          </a:p>
-        </p:txBody>
-      </p:sp>
       <p:sp>
         <p:nvSpPr>
           <p:cNvPr id="68" name="TextBox 67">
@@ -11778,19 +11721,17 @@
           </p:cNvPr>
           <p:cNvCxnSpPr>
             <a:cxnSpLocks/>
-            <a:stCxn id="43" idx="1"/>
-            <a:endCxn id="140" idx="3"/>
           </p:cNvCxnSpPr>
           <p:nvPr/>
         </p:nvCxnSpPr>
         <p:spPr>
           <a:xfrm rot="10800000" flipV="1">
-            <a:off x="2227754" y="10950375"/>
-            <a:ext cx="10140285" cy="471881"/>
+            <a:off x="2216304" y="6293436"/>
+            <a:ext cx="10149268" cy="5194448"/>
           </a:xfrm>
           <a:prstGeom prst="bentConnector3">
             <a:avLst>
-              <a:gd name="adj1" fmla="val 3690"/>
+              <a:gd name="adj1" fmla="val 22971"/>
             </a:avLst>
           </a:prstGeom>
           <a:ln w="19050">
@@ -12048,100 +11989,6 @@
               <a:ea typeface="Calibri"/>
               <a:cs typeface="Calibri"/>
             </a:endParaRPr>
-          </a:p>
-        </p:txBody>
-      </p:sp>
-      <p:cxnSp>
-        <p:nvCxnSpPr>
-          <p:cNvPr id="97" name="Straight Arrow Connector 7">
-            <a:extLst>
-              <a:ext uri="{FF2B5EF4-FFF2-40B4-BE49-F238E27FC236}">
-                <a16:creationId xmlns:a16="http://schemas.microsoft.com/office/drawing/2014/main" id="{F738894B-7224-9B69-C57B-005777ED4B33}"/>
-              </a:ext>
-            </a:extLst>
-          </p:cNvPr>
-          <p:cNvCxnSpPr>
-            <a:cxnSpLocks/>
-            <a:stCxn id="99" idx="1"/>
-            <a:endCxn id="175" idx="3"/>
-          </p:cNvCxnSpPr>
-          <p:nvPr/>
-        </p:nvCxnSpPr>
-        <p:spPr>
-          <a:xfrm flipH="1">
-            <a:off x="2268860" y="14250049"/>
-            <a:ext cx="10119544" cy="60519"/>
-          </a:xfrm>
-          <a:prstGeom prst="straightConnector1">
-            <a:avLst/>
-          </a:prstGeom>
-          <a:ln w="19050">
-            <a:solidFill>
-              <a:srgbClr val="7030A0"/>
-            </a:solidFill>
-            <a:headEnd type="triangle" w="med" len="med"/>
-            <a:tailEnd type="none" w="med" len="med"/>
-          </a:ln>
-        </p:spPr>
-        <p:style>
-          <a:lnRef idx="1">
-            <a:schemeClr val="accent1"/>
-          </a:lnRef>
-          <a:fillRef idx="0">
-            <a:schemeClr val="accent1"/>
-          </a:fillRef>
-          <a:effectRef idx="0">
-            <a:schemeClr val="accent1"/>
-          </a:effectRef>
-          <a:fontRef idx="minor">
-            <a:schemeClr val="tx1"/>
-          </a:fontRef>
-        </p:style>
-      </p:cxnSp>
-      <p:sp>
-        <p:nvSpPr>
-          <p:cNvPr id="99" name="Rectangle 98">
-            <a:extLst>
-              <a:ext uri="{FF2B5EF4-FFF2-40B4-BE49-F238E27FC236}">
-                <a16:creationId xmlns:a16="http://schemas.microsoft.com/office/drawing/2014/main" id="{0A816FDE-FAC6-B8C0-AA92-FC9141B83590}"/>
-              </a:ext>
-            </a:extLst>
-          </p:cNvPr>
-          <p:cNvSpPr/>
-          <p:nvPr/>
-        </p:nvSpPr>
-        <p:spPr>
-          <a:xfrm>
-            <a:off x="12388404" y="14046324"/>
-            <a:ext cx="3073307" cy="407449"/>
-          </a:xfrm>
-          <a:prstGeom prst="rect">
-            <a:avLst/>
-          </a:prstGeom>
-        </p:spPr>
-        <p:style>
-          <a:lnRef idx="2">
-            <a:schemeClr val="dk1"/>
-          </a:lnRef>
-          <a:fillRef idx="1">
-            <a:schemeClr val="lt1"/>
-          </a:fillRef>
-          <a:effectRef idx="0">
-            <a:schemeClr val="dk1"/>
-          </a:effectRef>
-          <a:fontRef idx="minor">
-            <a:schemeClr val="dk1"/>
-          </a:fontRef>
-        </p:style>
-        <p:txBody>
-          <a:bodyPr lIns="114301" tIns="57150" rIns="114301" bIns="57150" rtlCol="0" anchor="ctr"/>
-          <a:lstStyle/>
-          <a:p>
-            <a:pPr algn="ctr"/>
-            <a:r>
-              <a:rPr lang="en-US" sz="1600" dirty="0"/>
-              <a:t>/home/pr/exp3/train_model.py</a:t>
-            </a:r>
           </a:p>
         </p:txBody>
       </p:sp>
@@ -14258,6 +14105,54 @@
           </a:p>
         </p:txBody>
       </p:sp>
+      <p:cxnSp>
+        <p:nvCxnSpPr>
+          <p:cNvPr id="34" name="Straight Arrow Connector 7">
+            <a:extLst>
+              <a:ext uri="{FF2B5EF4-FFF2-40B4-BE49-F238E27FC236}">
+                <a16:creationId xmlns:a16="http://schemas.microsoft.com/office/drawing/2014/main" id="{D1C84D74-2DF4-8657-D9C1-D7200A8BEDD4}"/>
+              </a:ext>
+            </a:extLst>
+          </p:cNvPr>
+          <p:cNvCxnSpPr>
+            <a:cxnSpLocks/>
+            <a:endCxn id="175" idx="3"/>
+          </p:cNvCxnSpPr>
+          <p:nvPr/>
+        </p:nvCxnSpPr>
+        <p:spPr>
+          <a:xfrm rot="10800000" flipV="1">
+            <a:off x="2268861" y="6452750"/>
+            <a:ext cx="10107075" cy="7857818"/>
+          </a:xfrm>
+          <a:prstGeom prst="bentConnector3">
+            <a:avLst>
+              <a:gd name="adj1" fmla="val 18654"/>
+            </a:avLst>
+          </a:prstGeom>
+          <a:ln w="19050">
+            <a:solidFill>
+              <a:srgbClr val="7030A0"/>
+            </a:solidFill>
+            <a:headEnd type="triangle" w="med" len="med"/>
+            <a:tailEnd type="none" w="med" len="med"/>
+          </a:ln>
+        </p:spPr>
+        <p:style>
+          <a:lnRef idx="1">
+            <a:schemeClr val="accent1"/>
+          </a:lnRef>
+          <a:fillRef idx="0">
+            <a:schemeClr val="accent1"/>
+          </a:fillRef>
+          <a:effectRef idx="0">
+            <a:schemeClr val="accent1"/>
+          </a:effectRef>
+          <a:fontRef idx="minor">
+            <a:schemeClr val="tx1"/>
+          </a:fontRef>
+        </p:style>
+      </p:cxnSp>
     </p:spTree>
     <p:extLst>
       <p:ext uri="{BB962C8B-B14F-4D97-AF65-F5344CB8AC3E}">

</xml_diff>